<commit_message>
Almost done with initial
</commit_message>
<xml_diff>
--- a/images/teaser.pptx
+++ b/images/teaser.pptx
@@ -3416,94 +3416,6 @@
           </p:txBody>
         </p:sp>
       </p:grpSp>
-      <p:grpSp>
-        <p:nvGrpSpPr>
-          <p:cNvPr id="9" name="Group 8">
-            <a:extLst>
-              <a:ext uri="{FF2B5EF4-FFF2-40B4-BE49-F238E27FC236}">
-                <a16:creationId xmlns:a16="http://schemas.microsoft.com/office/drawing/2014/main" id="{0D2FFECA-84EB-454C-BA6D-02D7CD667D22}"/>
-              </a:ext>
-            </a:extLst>
-          </p:cNvPr>
-          <p:cNvGrpSpPr/>
-          <p:nvPr/>
-        </p:nvGrpSpPr>
-        <p:grpSpPr>
-          <a:xfrm>
-            <a:off x="5603630" y="1310325"/>
-            <a:ext cx="4845538" cy="1643063"/>
-            <a:chOff x="5650523" y="1151739"/>
-            <a:chExt cx="4845538" cy="1643063"/>
-          </a:xfrm>
-        </p:grpSpPr>
-        <p:pic>
-          <p:nvPicPr>
-            <p:cNvPr id="8" name="Picture 7">
-              <a:extLst>
-                <a:ext uri="{FF2B5EF4-FFF2-40B4-BE49-F238E27FC236}">
-                  <a16:creationId xmlns:a16="http://schemas.microsoft.com/office/drawing/2014/main" id="{36C55959-0A05-4515-80D4-26B8FA7BC9F2}"/>
-                </a:ext>
-              </a:extLst>
-            </p:cNvPr>
-            <p:cNvPicPr>
-              <a:picLocks noChangeAspect="1"/>
-            </p:cNvPicPr>
-            <p:nvPr/>
-          </p:nvPicPr>
-          <p:blipFill>
-            <a:blip r:embed="rId3"/>
-            <a:stretch>
-              <a:fillRect/>
-            </a:stretch>
-          </p:blipFill>
-          <p:spPr>
-            <a:xfrm>
-              <a:off x="5650523" y="1151739"/>
-              <a:ext cx="4845538" cy="1565699"/>
-            </a:xfrm>
-            <a:prstGeom prst="rect">
-              <a:avLst/>
-            </a:prstGeom>
-          </p:spPr>
-        </p:pic>
-        <p:sp>
-          <p:nvSpPr>
-            <p:cNvPr id="6" name="TextBox 5">
-              <a:extLst>
-                <a:ext uri="{FF2B5EF4-FFF2-40B4-BE49-F238E27FC236}">
-                  <a16:creationId xmlns:a16="http://schemas.microsoft.com/office/drawing/2014/main" id="{A9F12FB9-FD59-456D-9518-142FEEF0FD2B}"/>
-                </a:ext>
-              </a:extLst>
-            </p:cNvPr>
-            <p:cNvSpPr txBox="1"/>
-            <p:nvPr/>
-          </p:nvSpPr>
-          <p:spPr>
-            <a:xfrm>
-              <a:off x="6237140" y="2487025"/>
-              <a:ext cx="1226298" cy="307777"/>
-            </a:xfrm>
-            <a:prstGeom prst="rect">
-              <a:avLst/>
-            </a:prstGeom>
-            <a:noFill/>
-          </p:spPr>
-          <p:txBody>
-            <a:bodyPr wrap="none" rtlCol="0">
-              <a:spAutoFit/>
-            </a:bodyPr>
-            <a:lstStyle/>
-            <a:p>
-              <a:r>
-                <a:rPr lang="en-US" sz="1400" i="1" dirty="0">
-                  <a:latin typeface="Gill Sans MT" panose="020B0502020104020203" pitchFamily="34" charset="0"/>
-                </a:rPr>
-                <a:t>Qi et al. (2017)</a:t>
-              </a:r>
-            </a:p>
-          </p:txBody>
-        </p:sp>
-      </p:grpSp>
     </p:spTree>
     <p:extLst>
       <p:ext uri="{BB962C8B-B14F-4D97-AF65-F5344CB8AC3E}">

</xml_diff>